<commit_message>
Minor fixes for delegates and events basics
</commit_message>
<xml_diff>
--- a/Courses/Software-Sciences/Module-1-OOP/12.1-Delegates-and-Events-Basics/12.1-Delegates-and-Events-Basics.pptx
+++ b/Courses/Software-Sciences/Module-1-OOP/12.1-Delegates-and-Events-Basics/12.1-Delegates-and-Events-Basics.pptx
@@ -286,7 +286,7 @@
             </a:lvl1pPr>
           </a:lstStyle>
           <a:p>
-            <a:endParaRPr lang="bg-BG"/>
+            <a:endParaRPr lang="bg-BG" dirty="0"/>
           </a:p>
         </p:txBody>
       </p:sp>
@@ -325,9 +325,9 @@
           <a:p>
             <a:fld id="{4E087215-0C8F-4762-A664-737A353EC9A4}" type="datetimeFigureOut">
               <a:rPr lang="bg-BG" smtClean="0"/>
-              <a:t>18.01.23 г.</a:t>
+              <a:t>17.05.23 г.</a:t>
             </a:fld>
-            <a:endParaRPr lang="bg-BG"/>
+            <a:endParaRPr lang="bg-BG" dirty="0"/>
           </a:p>
         </p:txBody>
       </p:sp>
@@ -483,7 +483,7 @@
             </a:lvl1pPr>
           </a:lstStyle>
           <a:p>
-            <a:endParaRPr lang="en-US"/>
+            <a:endParaRPr lang="en-US" dirty="0"/>
           </a:p>
         </p:txBody>
       </p:sp>
@@ -516,9 +516,9 @@
           <a:p>
             <a:fld id="{72D84649-876A-46C9-8472-14CB09C070D8}" type="datetimeFigureOut">
               <a:rPr lang="en-US" smtClean="0"/>
-              <a:t>1/18/23</a:t>
+              <a:t>5/17/23</a:t>
             </a:fld>
-            <a:endParaRPr lang="en-US"/>
+            <a:endParaRPr lang="en-US" dirty="0"/>
           </a:p>
         </p:txBody>
       </p:sp>
@@ -551,7 +551,7 @@
           <a:bodyPr vert="horz" lIns="91440" tIns="45720" rIns="91440" bIns="45720" rtlCol="0" anchor="ctr"/>
           <a:lstStyle/>
           <a:p>
-            <a:endParaRPr lang="en-US"/>
+            <a:endParaRPr lang="en-US" dirty="0"/>
           </a:p>
         </p:txBody>
       </p:sp>
@@ -982,7 +982,7 @@
           <a:bodyPr/>
           <a:lstStyle/>
           <a:p>
-            <a:endParaRPr lang="en-US"/>
+            <a:endParaRPr lang="en-US" dirty="0"/>
           </a:p>
         </p:txBody>
       </p:sp>
@@ -1278,7 +1278,7 @@
           <a:bodyPr/>
           <a:lstStyle/>
           <a:p>
-            <a:endParaRPr lang="bg-BG"/>
+            <a:endParaRPr lang="bg-BG" dirty="0"/>
           </a:p>
         </p:txBody>
       </p:sp>
@@ -1389,7 +1389,7 @@
           <a:bodyPr/>
           <a:lstStyle/>
           <a:p>
-            <a:endParaRPr lang="en-BG" dirty="0"/>
+            <a:endParaRPr lang="en-BG"/>
           </a:p>
         </p:txBody>
       </p:sp>
@@ -1432,20 +1432,19 @@
           <a:lstStyle/>
           <a:p>
             <a:r>
-              <a:rPr lang="en-US"/>
+              <a:rPr lang="en-US" dirty="0"/>
               <a:t>© SoftUni – </a:t>
             </a:r>
             <a:r>
-              <a:rPr lang="en-US" u="sng">
+              <a:rPr lang="en-US" u="sng" dirty="0">
                 <a:hlinkClick r:id="rId3"/>
               </a:rPr>
               <a:t>https://softuni.org</a:t>
             </a:r>
             <a:r>
-              <a:rPr lang="en-US"/>
+              <a:rPr lang="en-US" dirty="0"/>
               <a:t>. Copyrighted document. Unauthorized copy or reproduction is not permitted.</a:t>
             </a:r>
-            <a:endParaRPr lang="en-US" dirty="0"/>
           </a:p>
         </p:txBody>
       </p:sp>
@@ -1506,7 +1505,7 @@
           <a:bodyPr/>
           <a:lstStyle/>
           <a:p>
-            <a:endParaRPr lang="en-BG" dirty="0"/>
+            <a:endParaRPr lang="en-BG"/>
           </a:p>
         </p:txBody>
       </p:sp>
@@ -1549,20 +1548,19 @@
           <a:lstStyle/>
           <a:p>
             <a:r>
-              <a:rPr lang="en-US"/>
+              <a:rPr lang="en-US" dirty="0"/>
               <a:t>© SoftUni – </a:t>
             </a:r>
             <a:r>
-              <a:rPr lang="en-US" u="sng">
+              <a:rPr lang="en-US" u="sng" dirty="0">
                 <a:hlinkClick r:id="rId3"/>
               </a:rPr>
               <a:t>https://softuni.org</a:t>
             </a:r>
             <a:r>
-              <a:rPr lang="en-US"/>
+              <a:rPr lang="en-US" dirty="0"/>
               <a:t>. Copyrighted document. Unauthorized copy or reproduction is not permitted.</a:t>
             </a:r>
-            <a:endParaRPr lang="en-US" dirty="0"/>
           </a:p>
         </p:txBody>
       </p:sp>
@@ -1774,7 +1772,7 @@
           <a:bodyPr/>
           <a:lstStyle/>
           <a:p>
-            <a:endParaRPr lang="en-BG" dirty="0"/>
+            <a:endParaRPr lang="en-BG"/>
           </a:p>
         </p:txBody>
       </p:sp>
@@ -1817,20 +1815,19 @@
           <a:lstStyle/>
           <a:p>
             <a:r>
-              <a:rPr lang="en-US"/>
+              <a:rPr lang="en-US" dirty="0"/>
               <a:t>© SoftUni – </a:t>
             </a:r>
             <a:r>
-              <a:rPr lang="en-US" u="sng">
+              <a:rPr lang="en-US" u="sng" dirty="0">
                 <a:hlinkClick r:id="rId3"/>
               </a:rPr>
               <a:t>https://softuni.org</a:t>
             </a:r>
             <a:r>
-              <a:rPr lang="en-US"/>
+              <a:rPr lang="en-US" dirty="0"/>
               <a:t>. Copyrighted document. Unauthorized copy or reproduction is not permitted.</a:t>
             </a:r>
-            <a:endParaRPr lang="en-US" dirty="0"/>
           </a:p>
         </p:txBody>
       </p:sp>
@@ -1891,7 +1888,7 @@
           <a:bodyPr/>
           <a:lstStyle/>
           <a:p>
-            <a:endParaRPr lang="en-BG" dirty="0"/>
+            <a:endParaRPr lang="en-BG"/>
           </a:p>
         </p:txBody>
       </p:sp>
@@ -1934,20 +1931,19 @@
           <a:lstStyle/>
           <a:p>
             <a:r>
-              <a:rPr lang="en-US"/>
+              <a:rPr lang="en-US" dirty="0"/>
               <a:t>© SoftUni – </a:t>
             </a:r>
             <a:r>
-              <a:rPr lang="en-US" u="sng">
+              <a:rPr lang="en-US" u="sng" dirty="0">
                 <a:hlinkClick r:id="rId3"/>
               </a:rPr>
               <a:t>https://softuni.org</a:t>
             </a:r>
             <a:r>
-              <a:rPr lang="en-US"/>
+              <a:rPr lang="en-US" dirty="0"/>
               <a:t>. Copyrighted document. Unauthorized copy or reproduction is not permitted.</a:t>
             </a:r>
-            <a:endParaRPr lang="en-US" dirty="0"/>
           </a:p>
         </p:txBody>
       </p:sp>
@@ -2008,7 +2004,7 @@
           <a:bodyPr/>
           <a:lstStyle/>
           <a:p>
-            <a:endParaRPr lang="en-US"/>
+            <a:endParaRPr lang="en-US" dirty="0"/>
           </a:p>
         </p:txBody>
       </p:sp>
@@ -2143,7 +2139,7 @@
           <a:bodyPr/>
           <a:lstStyle/>
           <a:p>
-            <a:endParaRPr lang="en-US"/>
+            <a:endParaRPr lang="en-US" dirty="0"/>
           </a:p>
         </p:txBody>
       </p:sp>
@@ -2421,7 +2417,7 @@
               <a:tabLst/>
               <a:defRPr/>
             </a:pPr>
-            <a:endParaRPr kumimoji="0" lang="en-US" altLang="ko-KR" sz="2398" b="0" i="0" u="none" strike="noStrike" kern="1200" cap="none" spc="0" normalizeH="0" baseline="0" noProof="0">
+            <a:endParaRPr kumimoji="0" lang="en-US" altLang="ko-KR" sz="2398" b="0" i="0" u="none" strike="noStrike" kern="1200" cap="none" spc="0" normalizeH="0" baseline="0" noProof="0" dirty="0">
               <a:ln>
                 <a:noFill/>
               </a:ln>
@@ -3050,7 +3046,7 @@
               <a:tabLst/>
               <a:defRPr/>
             </a:pPr>
-            <a:endParaRPr kumimoji="0" lang="en-US" altLang="ko-KR" sz="2398" b="0" i="0" u="none" strike="noStrike" kern="1200" cap="none" spc="0" normalizeH="0" baseline="0" noProof="0">
+            <a:endParaRPr kumimoji="0" lang="en-US" altLang="ko-KR" sz="2398" b="0" i="0" u="none" strike="noStrike" kern="1200" cap="none" spc="0" normalizeH="0" baseline="0" noProof="0" dirty="0">
               <a:ln>
                 <a:noFill/>
               </a:ln>
@@ -3173,7 +3169,7 @@
               <a:tabLst/>
               <a:defRPr/>
             </a:pPr>
-            <a:endParaRPr kumimoji="0" lang="en-US" altLang="ko-KR" sz="2398" b="0" i="0" u="none" strike="noStrike" kern="1200" cap="none" spc="0" normalizeH="0" baseline="0" noProof="0">
+            <a:endParaRPr kumimoji="0" lang="en-US" altLang="ko-KR" sz="2398" b="0" i="0" u="none" strike="noStrike" kern="1200" cap="none" spc="0" normalizeH="0" baseline="0" noProof="0" dirty="0">
               <a:ln>
                 <a:noFill/>
               </a:ln>
@@ -3446,7 +3442,7 @@
               <a:tabLst/>
               <a:defRPr/>
             </a:pPr>
-            <a:endParaRPr kumimoji="0" lang="en-US" altLang="ko-KR" sz="2398" b="0" i="0" u="none" strike="noStrike" kern="1200" cap="none" spc="0" normalizeH="0" baseline="0" noProof="0">
+            <a:endParaRPr kumimoji="0" lang="en-US" altLang="ko-KR" sz="2398" b="0" i="0" u="none" strike="noStrike" kern="1200" cap="none" spc="0" normalizeH="0" baseline="0" noProof="0" dirty="0">
               <a:ln>
                 <a:noFill/>
               </a:ln>
@@ -3632,7 +3628,7 @@
               <a:pPr/>
               <a:t>‹#›</a:t>
             </a:fld>
-            <a:endParaRPr lang="en-US" noProof="0"/>
+            <a:endParaRPr lang="en-US" noProof="0" dirty="0"/>
           </a:p>
         </p:txBody>
       </p:sp>
@@ -3786,7 +3782,7 @@
           </a:lstStyle>
           <a:p>
             <a:r>
-              <a:rPr lang="en-US" altLang="ko-KR" noProof="0"/>
+              <a:rPr lang="en-US" altLang="ko-KR" noProof="0" dirty="0"/>
               <a:t>Your Picture Here</a:t>
             </a:r>
           </a:p>
@@ -3850,7 +3846,7 @@
               <a:tabLst/>
               <a:defRPr/>
             </a:pPr>
-            <a:endParaRPr kumimoji="0" lang="en-US" altLang="ko-KR" sz="2398" b="0" i="0" u="none" strike="noStrike" kern="1200" cap="none" spc="0" normalizeH="0" baseline="0" noProof="0">
+            <a:endParaRPr kumimoji="0" lang="en-US" altLang="ko-KR" sz="2398" b="0" i="0" u="none" strike="noStrike" kern="1200" cap="none" spc="0" normalizeH="0" baseline="0" noProof="0" dirty="0">
               <a:ln>
                 <a:noFill/>
               </a:ln>
@@ -3925,7 +3921,7 @@
               <a:tabLst/>
               <a:defRPr/>
             </a:pPr>
-            <a:endParaRPr kumimoji="0" lang="en-US" altLang="ko-KR" sz="2398" b="0" i="0" u="none" strike="noStrike" kern="1200" cap="none" spc="0" normalizeH="0" baseline="0" noProof="0">
+            <a:endParaRPr kumimoji="0" lang="en-US" altLang="ko-KR" sz="2398" b="0" i="0" u="none" strike="noStrike" kern="1200" cap="none" spc="0" normalizeH="0" baseline="0" noProof="0" dirty="0">
               <a:ln>
                 <a:noFill/>
               </a:ln>
@@ -4006,7 +4002,7 @@
               <a:tabLst/>
               <a:defRPr/>
             </a:pPr>
-            <a:endParaRPr kumimoji="0" lang="en-US" altLang="ko-KR" sz="2398" b="0" i="0" u="none" strike="noStrike" kern="1200" cap="none" spc="0" normalizeH="0" baseline="0" noProof="0">
+            <a:endParaRPr kumimoji="0" lang="en-US" altLang="ko-KR" sz="2398" b="0" i="0" u="none" strike="noStrike" kern="1200" cap="none" spc="0" normalizeH="0" baseline="0" noProof="0" dirty="0">
               <a:ln>
                 <a:noFill/>
               </a:ln>
@@ -4087,7 +4083,7 @@
               <a:tabLst/>
               <a:defRPr/>
             </a:pPr>
-            <a:endParaRPr kumimoji="0" lang="en-US" altLang="ko-KR" sz="2398" b="0" i="0" u="none" strike="noStrike" kern="1200" cap="none" spc="0" normalizeH="0" baseline="0" noProof="0">
+            <a:endParaRPr kumimoji="0" lang="en-US" altLang="ko-KR" sz="2398" b="0" i="0" u="none" strike="noStrike" kern="1200" cap="none" spc="0" normalizeH="0" baseline="0" noProof="0" dirty="0">
               <a:ln>
                 <a:noFill/>
               </a:ln>
@@ -4291,7 +4287,7 @@
               <a:tabLst/>
               <a:defRPr/>
             </a:pPr>
-            <a:endParaRPr kumimoji="0" lang="en-US" altLang="ko-KR" sz="2398" b="0" i="0" u="none" strike="noStrike" kern="1200" cap="none" spc="0" normalizeH="0" baseline="0" noProof="0">
+            <a:endParaRPr kumimoji="0" lang="en-US" altLang="ko-KR" sz="2398" b="0" i="0" u="none" strike="noStrike" kern="1200" cap="none" spc="0" normalizeH="0" baseline="0" noProof="0" dirty="0">
               <a:ln>
                 <a:noFill/>
               </a:ln>
@@ -5797,7 +5793,7 @@
               <a:tabLst/>
               <a:defRPr/>
             </a:pPr>
-            <a:endParaRPr kumimoji="0" lang="en-US" altLang="ko-KR" sz="2398" b="0" i="0" u="none" strike="noStrike" kern="1200" cap="none" spc="0" normalizeH="0" baseline="0" noProof="0">
+            <a:endParaRPr kumimoji="0" lang="en-US" altLang="ko-KR" sz="2398" b="0" i="0" u="none" strike="noStrike" kern="1200" cap="none" spc="0" normalizeH="0" baseline="0" noProof="0" dirty="0">
               <a:ln>
                 <a:noFill/>
               </a:ln>
@@ -6125,7 +6121,7 @@
               <a:tabLst/>
               <a:defRPr/>
             </a:pPr>
-            <a:endParaRPr kumimoji="0" lang="en-US" altLang="ko-KR" sz="2398" b="0" i="0" u="none" strike="noStrike" kern="1200" cap="none" spc="0" normalizeH="0" baseline="0" noProof="0">
+            <a:endParaRPr kumimoji="0" lang="en-US" altLang="ko-KR" sz="2398" b="0" i="0" u="none" strike="noStrike" kern="1200" cap="none" spc="0" normalizeH="0" baseline="0" noProof="0" dirty="0">
               <a:ln>
                 <a:noFill/>
               </a:ln>
@@ -6295,7 +6291,7 @@
               <a:pPr/>
               <a:t>‹#›</a:t>
             </a:fld>
-            <a:endParaRPr lang="en-US" noProof="0"/>
+            <a:endParaRPr lang="en-US" noProof="0" dirty="0"/>
           </a:p>
         </p:txBody>
       </p:sp>
@@ -6490,7 +6486,7 @@
               <a:tabLst/>
               <a:defRPr/>
             </a:pPr>
-            <a:endParaRPr kumimoji="0" lang="en-US" altLang="ko-KR" sz="2398" b="0" i="0" u="none" strike="noStrike" kern="1200" cap="none" spc="0" normalizeH="0" baseline="0" noProof="0">
+            <a:endParaRPr kumimoji="0" lang="en-US" altLang="ko-KR" sz="2398" b="0" i="0" u="none" strike="noStrike" kern="1200" cap="none" spc="0" normalizeH="0" baseline="0" noProof="0" dirty="0">
               <a:ln>
                 <a:noFill/>
               </a:ln>
@@ -7751,7 +7747,7 @@
               <a:pPr/>
               <a:t>‹#›</a:t>
             </a:fld>
-            <a:endParaRPr lang="en-US" noProof="0"/>
+            <a:endParaRPr lang="en-US" noProof="0" dirty="0"/>
           </a:p>
         </p:txBody>
       </p:sp>
@@ -7819,7 +7815,7 @@
               <a:tabLst/>
               <a:defRPr/>
             </a:pPr>
-            <a:endParaRPr kumimoji="0" lang="en-US" altLang="ko-KR" sz="2398" b="0" i="0" u="none" strike="noStrike" kern="1200" cap="none" spc="0" normalizeH="0" baseline="0" noProof="0">
+            <a:endParaRPr kumimoji="0" lang="en-US" altLang="ko-KR" sz="2398" b="0" i="0" u="none" strike="noStrike" kern="1200" cap="none" spc="0" normalizeH="0" baseline="0" noProof="0" dirty="0">
               <a:ln>
                 <a:noFill/>
               </a:ln>
@@ -8187,7 +8183,7 @@
               <a:tabLst/>
               <a:defRPr/>
             </a:pPr>
-            <a:endParaRPr kumimoji="0" lang="en-US" altLang="ko-KR" sz="2398" b="0" i="0" u="none" strike="noStrike" kern="1200" cap="none" spc="0" normalizeH="0" baseline="0" noProof="0">
+            <a:endParaRPr kumimoji="0" lang="en-US" altLang="ko-KR" sz="2398" b="0" i="0" u="none" strike="noStrike" kern="1200" cap="none" spc="0" normalizeH="0" baseline="0" noProof="0" dirty="0">
               <a:ln>
                 <a:noFill/>
               </a:ln>
@@ -9604,7 +9600,7 @@
               <a:rPr lang="en-US" u="sng" dirty="0">
                 <a:hlinkClick r:id="rId2"/>
               </a:rPr>
-              <a:t>https://judge.softuni.bg/Contests/Practice/Index/3168#2</a:t>
+              <a:t>https://judge.softuni.org/Contests/Practice/Index/4070#2</a:t>
             </a:r>
             <a:endParaRPr lang="en-US" dirty="0"/>
           </a:p>
@@ -11638,7 +11634,7 @@
               <a:rPr lang="en-US" u="sng" dirty="0">
                 <a:hlinkClick r:id="rId2"/>
               </a:rPr>
-              <a:t>https://judge.softuni.bg/Contests/Practice/Index/3168#3</a:t>
+              <a:t>https://judge.softuni.org/Contests/Practice/Index/4070#3</a:t>
             </a:r>
             <a:endParaRPr lang="en-US" dirty="0"/>
           </a:p>
@@ -11961,22 +11957,13 @@
               <a:t>Можем да подаваме </a:t>
             </a:r>
             <a:r>
-              <a:rPr lang="en-US" sz="3400" b="1" dirty="0" err="1">
+              <a:rPr lang="en-US" sz="3400" b="1" dirty="0">
                 <a:solidFill>
                   <a:schemeClr val="bg1"/>
                 </a:solidFill>
                 <a:latin typeface="Consolas" panose="020B0609020204030204" pitchFamily="49" charset="0"/>
               </a:rPr>
-              <a:t>Func</a:t>
-            </a:r>
-            <a:r>
-              <a:rPr lang="en-US" sz="3400" b="1" dirty="0">
-                <a:solidFill>
-                  <a:schemeClr val="bg1"/>
-                </a:solidFill>
-                <a:latin typeface="Consolas" panose="020B0609020204030204" pitchFamily="49" charset="0"/>
-              </a:rPr>
-              <a:t>&lt;T&gt;</a:t>
+              <a:t>Func&lt;T&gt;</a:t>
             </a:r>
             <a:r>
               <a:rPr lang="en-US" sz="3400" dirty="0"/>
@@ -15617,7 +15604,7 @@
               <a:rPr lang="en-US" u="sng" dirty="0">
                 <a:hlinkClick r:id="rId2"/>
               </a:rPr>
-              <a:t>https://judge.softuni.bg/Contests/Practice/Index/3168#4</a:t>
+              <a:t>https://judge.softuni.org/Contests/Practice/Index/4070#4</a:t>
             </a:r>
             <a:endParaRPr lang="en-US" dirty="0"/>
           </a:p>
@@ -18611,15 +18598,7 @@
           <a:p>
             <a:r>
               <a:rPr lang="bg-BG" dirty="0"/>
-              <a:t>Предикати</a:t>
-            </a:r>
-            <a:r>
-              <a:rPr lang="en-US" dirty="0"/>
-              <a:t> – </a:t>
-            </a:r>
-            <a:r>
-              <a:rPr lang="bg-BG" dirty="0"/>
-              <a:t>пример</a:t>
+              <a:t>Пример: предикати</a:t>
             </a:r>
             <a:endParaRPr lang="en-US" dirty="0"/>
           </a:p>
@@ -19577,12 +19556,8 @@
               <a:t> и </a:t>
             </a:r>
             <a:r>
-              <a:rPr lang="en-US" dirty="0" err="1"/>
-              <a:t>EventHandler</a:t>
-            </a:r>
-            <a:r>
               <a:rPr lang="en-US" dirty="0"/>
-              <a:t> </a:t>
+              <a:t>EventHandler </a:t>
             </a:r>
           </a:p>
         </p:txBody>
@@ -20849,25 +20824,7 @@
                 </a:solidFill>
                 <a:latin typeface="+mn-lt"/>
               </a:rPr>
-              <a:t> </a:t>
-            </a:r>
-            <a:r>
-              <a:rPr lang="en-US" dirty="0" err="1">
-                <a:solidFill>
-                  <a:srgbClr val="00843C"/>
-                </a:solidFill>
-                <a:latin typeface="+mn-lt"/>
-              </a:rPr>
-              <a:t>ProcessCompleted</a:t>
-            </a:r>
-            <a:r>
-              <a:rPr lang="en-US" dirty="0">
-                <a:solidFill>
-                  <a:srgbClr val="00843C"/>
-                </a:solidFill>
-                <a:latin typeface="+mn-lt"/>
-              </a:rPr>
-              <a:t> </a:t>
+              <a:t> ProcessCompleted </a:t>
             </a:r>
             <a:r>
               <a:rPr lang="bg-BG" dirty="0">
@@ -21268,23 +21225,7 @@
                   <a:srgbClr val="FFFFFF"/>
                 </a:solidFill>
               </a:rPr>
-              <a:t>Извикваме </a:t>
-            </a:r>
-            <a:r>
-              <a:rPr lang="bg-BG" sz="2400" b="1" dirty="0" err="1">
-                <a:solidFill>
-                  <a:srgbClr val="FFFFFF"/>
-                </a:solidFill>
-              </a:rPr>
-              <a:t>обработчика</a:t>
-            </a:r>
-            <a:r>
-              <a:rPr lang="bg-BG" sz="2400" b="1" dirty="0">
-                <a:solidFill>
-                  <a:srgbClr val="FFFFFF"/>
-                </a:solidFill>
-              </a:rPr>
-              <a:t> на събитието (ако има)</a:t>
+              <a:t>Извикваме обработчика на събитието (ако има)</a:t>
             </a:r>
           </a:p>
         </p:txBody>
@@ -25765,20 +25706,16 @@
           <a:lstStyle/>
           <a:p>
             <a:r>
+              <a:rPr lang="bg-BG" dirty="0"/>
+              <a:t>Пример: </a:t>
+            </a:r>
+            <a:r>
               <a:rPr lang="en-US" dirty="0"/>
               <a:t>UI Event Handler </a:t>
             </a:r>
             <a:r>
               <a:rPr lang="bg-BG" dirty="0"/>
-              <a:t>за клик на мишката </a:t>
-            </a:r>
-            <a:r>
-              <a:rPr lang="en-US" dirty="0"/>
-              <a:t>– </a:t>
-            </a:r>
-            <a:r>
-              <a:rPr lang="bg-BG" dirty="0"/>
-              <a:t>пример</a:t>
+              <a:t>за клик на мишката</a:t>
             </a:r>
             <a:endParaRPr lang="en-US" dirty="0"/>
           </a:p>
@@ -26855,7 +26792,7 @@
           <a:lstStyle/>
           <a:p>
             <a:r>
-              <a:rPr lang="fr-FR"/>
+              <a:rPr lang="fr-FR" dirty="0"/>
               <a:t>Func&lt;T, V&gt;, Action&lt;T&gt;</a:t>
             </a:r>
             <a:endParaRPr lang="bg-BG" dirty="0"/>
@@ -30028,20 +29965,12 @@
               <a:t>          </a:t>
             </a:r>
             <a:r>
-              <a:rPr lang="en-US" dirty="0" err="1">
+              <a:rPr lang="en-US" dirty="0">
                 <a:solidFill>
                   <a:srgbClr val="234465"/>
                 </a:solidFill>
               </a:rPr>
-              <a:t>keyPressed</a:t>
-            </a:r>
-            <a:r>
-              <a:rPr lang="en-US" dirty="0">
-                <a:solidFill>
-                  <a:srgbClr val="234465"/>
-                </a:solidFill>
-              </a:rPr>
-              <a:t>); break;</a:t>
+              <a:t>keyPressed); break;</a:t>
             </a:r>
           </a:p>
           <a:p>
@@ -32502,7 +32431,7 @@
             <a:lstStyle/>
             <a:p>
               <a:pPr algn="ctr"/>
-              <a:endParaRPr lang="ko-KR" altLang="en-US" sz="2398">
+              <a:endParaRPr lang="ko-KR" altLang="en-US" sz="2398" dirty="0">
                 <a:solidFill>
                   <a:schemeClr val="bg1"/>
                 </a:solidFill>
@@ -32563,7 +32492,7 @@
             <a:lstStyle/>
             <a:p>
               <a:pPr algn="ctr"/>
-              <a:endParaRPr lang="ko-KR" altLang="en-US" sz="2398">
+              <a:endParaRPr lang="ko-KR" altLang="en-US" sz="2398" dirty="0">
                 <a:solidFill>
                   <a:schemeClr val="tx1"/>
                 </a:solidFill>
@@ -33660,7 +33589,7 @@
               <a:t>© </a:t>
             </a:r>
             <a:r>
-              <a:rPr lang="bg-BG" dirty="0" err="1"/>
+              <a:rPr lang="bg-BG" dirty="0"/>
               <a:t>СофтУни</a:t>
             </a:r>
             <a:r>
@@ -34983,20 +34912,12 @@
           <a:p>
             <a:pPr algn="ctr"/>
             <a:r>
-              <a:rPr lang="bg-BG" sz="2799" b="1" dirty="0" err="1">
+              <a:rPr lang="bg-BG" sz="2799" b="1" dirty="0">
                 <a:solidFill>
                   <a:srgbClr val="FFFFFF"/>
                 </a:solidFill>
               </a:rPr>
-              <a:t>Ламбда</a:t>
-            </a:r>
-            <a:r>
-              <a:rPr lang="bg-BG" sz="2799" b="1" dirty="0">
-                <a:solidFill>
-                  <a:srgbClr val="FFFFFF"/>
-                </a:solidFill>
-              </a:rPr>
-              <a:t> израз</a:t>
+              <a:t>Ламбда израз</a:t>
             </a:r>
           </a:p>
         </p:txBody>
@@ -38023,7 +37944,7 @@
               <a:rPr lang="en-US" u="sng" dirty="0">
                 <a:hlinkClick r:id="rId2"/>
               </a:rPr>
-              <a:t>https://judge.softuni.bg/Contests/Practice/Index/3168#1</a:t>
+              <a:t>https://judge.softuni.org/Contests/Practice/Index/4070#1</a:t>
             </a:r>
             <a:endParaRPr lang="en-US" dirty="0"/>
           </a:p>

</xml_diff>